<commit_message>
update what to include
</commit_message>
<xml_diff>
--- a/8. Writing a manuscript/what to include in a paper.pptx
+++ b/8. Writing a manuscript/what to include in a paper.pptx
@@ -5,7 +5,7 @@
     <p:sldMasterId id="2147483648" r:id="rId1"/>
   </p:sldMasterIdLst>
   <p:notesMasterIdLst>
-    <p:notesMasterId r:id="rId13"/>
+    <p:notesMasterId r:id="rId14"/>
   </p:notesMasterIdLst>
   <p:sldIdLst>
     <p:sldId id="265" r:id="rId2"/>
@@ -14,11 +14,12 @@
     <p:sldId id="256" r:id="rId5"/>
     <p:sldId id="270" r:id="rId6"/>
     <p:sldId id="275" r:id="rId7"/>
-    <p:sldId id="262" r:id="rId8"/>
-    <p:sldId id="269" r:id="rId9"/>
-    <p:sldId id="272" r:id="rId10"/>
-    <p:sldId id="261" r:id="rId11"/>
-    <p:sldId id="266" r:id="rId12"/>
+    <p:sldId id="276" r:id="rId8"/>
+    <p:sldId id="262" r:id="rId9"/>
+    <p:sldId id="269" r:id="rId10"/>
+    <p:sldId id="272" r:id="rId11"/>
+    <p:sldId id="261" r:id="rId12"/>
+    <p:sldId id="266" r:id="rId13"/>
   </p:sldIdLst>
   <p:sldSz cx="9144000" cy="6858000" type="screen4x3"/>
   <p:notesSz cx="6858000" cy="9144000"/>
@@ -219,7 +220,7 @@
             <a:fld id="{66F86660-A67E-4103-AD86-8CA849D0727F}" type="datetimeFigureOut">
               <a:rPr lang="en-US" smtClean="0"/>
               <a:pPr/>
-              <a:t>11/26/18</a:t>
+              <a:t>12/3/19</a:t>
             </a:fld>
             <a:endParaRPr lang="en-US"/>
           </a:p>
@@ -867,7 +868,7 @@
             <a:fld id="{3ED7F6E3-333F-471C-B26F-404B9E4304DE}" type="datetimeFigureOut">
               <a:rPr lang="en-US" smtClean="0"/>
               <a:pPr/>
-              <a:t>11/26/18</a:t>
+              <a:t>12/3/19</a:t>
             </a:fld>
             <a:endParaRPr lang="en-US"/>
           </a:p>
@@ -1032,7 +1033,7 @@
             <a:fld id="{3ED7F6E3-333F-471C-B26F-404B9E4304DE}" type="datetimeFigureOut">
               <a:rPr lang="en-US" smtClean="0"/>
               <a:pPr/>
-              <a:t>11/26/18</a:t>
+              <a:t>12/3/19</a:t>
             </a:fld>
             <a:endParaRPr lang="en-US"/>
           </a:p>
@@ -1207,7 +1208,7 @@
             <a:fld id="{3ED7F6E3-333F-471C-B26F-404B9E4304DE}" type="datetimeFigureOut">
               <a:rPr lang="en-US" smtClean="0"/>
               <a:pPr/>
-              <a:t>11/26/18</a:t>
+              <a:t>12/3/19</a:t>
             </a:fld>
             <a:endParaRPr lang="en-US"/>
           </a:p>
@@ -1372,7 +1373,7 @@
             <a:fld id="{3ED7F6E3-333F-471C-B26F-404B9E4304DE}" type="datetimeFigureOut">
               <a:rPr lang="en-US" smtClean="0"/>
               <a:pPr/>
-              <a:t>11/26/18</a:t>
+              <a:t>12/3/19</a:t>
             </a:fld>
             <a:endParaRPr lang="en-US"/>
           </a:p>
@@ -1614,7 +1615,7 @@
             <a:fld id="{3ED7F6E3-333F-471C-B26F-404B9E4304DE}" type="datetimeFigureOut">
               <a:rPr lang="en-US" smtClean="0"/>
               <a:pPr/>
-              <a:t>11/26/18</a:t>
+              <a:t>12/3/19</a:t>
             </a:fld>
             <a:endParaRPr lang="en-US"/>
           </a:p>
@@ -1896,7 +1897,7 @@
             <a:fld id="{3ED7F6E3-333F-471C-B26F-404B9E4304DE}" type="datetimeFigureOut">
               <a:rPr lang="en-US" smtClean="0"/>
               <a:pPr/>
-              <a:t>11/26/18</a:t>
+              <a:t>12/3/19</a:t>
             </a:fld>
             <a:endParaRPr lang="en-US"/>
           </a:p>
@@ -2312,7 +2313,7 @@
             <a:fld id="{3ED7F6E3-333F-471C-B26F-404B9E4304DE}" type="datetimeFigureOut">
               <a:rPr lang="en-US" smtClean="0"/>
               <a:pPr/>
-              <a:t>11/26/18</a:t>
+              <a:t>12/3/19</a:t>
             </a:fld>
             <a:endParaRPr lang="en-US"/>
           </a:p>
@@ -2426,7 +2427,7 @@
             <a:fld id="{3ED7F6E3-333F-471C-B26F-404B9E4304DE}" type="datetimeFigureOut">
               <a:rPr lang="en-US" smtClean="0"/>
               <a:pPr/>
-              <a:t>11/26/18</a:t>
+              <a:t>12/3/19</a:t>
             </a:fld>
             <a:endParaRPr lang="en-US"/>
           </a:p>
@@ -2518,7 +2519,7 @@
             <a:fld id="{3ED7F6E3-333F-471C-B26F-404B9E4304DE}" type="datetimeFigureOut">
               <a:rPr lang="en-US" smtClean="0"/>
               <a:pPr/>
-              <a:t>11/26/18</a:t>
+              <a:t>12/3/19</a:t>
             </a:fld>
             <a:endParaRPr lang="en-US"/>
           </a:p>
@@ -2790,7 +2791,7 @@
             <a:fld id="{3ED7F6E3-333F-471C-B26F-404B9E4304DE}" type="datetimeFigureOut">
               <a:rPr lang="en-US" smtClean="0"/>
               <a:pPr/>
-              <a:t>11/26/18</a:t>
+              <a:t>12/3/19</a:t>
             </a:fld>
             <a:endParaRPr lang="en-US"/>
           </a:p>
@@ -3039,7 +3040,7 @@
             <a:fld id="{3ED7F6E3-333F-471C-B26F-404B9E4304DE}" type="datetimeFigureOut">
               <a:rPr lang="en-US" smtClean="0"/>
               <a:pPr/>
-              <a:t>11/26/18</a:t>
+              <a:t>12/3/19</a:t>
             </a:fld>
             <a:endParaRPr lang="en-US"/>
           </a:p>
@@ -3247,7 +3248,7 @@
             <a:fld id="{3ED7F6E3-333F-471C-B26F-404B9E4304DE}" type="datetimeFigureOut">
               <a:rPr lang="en-US" smtClean="0"/>
               <a:pPr/>
-              <a:t>11/26/18</a:t>
+              <a:t>12/3/19</a:t>
             </a:fld>
             <a:endParaRPr lang="en-US"/>
           </a:p>
@@ -3659,13 +3660,7 @@
           <a:p>
             <a:r>
               <a:rPr lang="en-US" dirty="0"/>
-              <a:t>November 26, 2018</a:t>
-            </a:r>
-          </a:p>
-          <a:p>
-            <a:r>
-              <a:rPr lang="en-US" dirty="0"/>
-              <a:t>EEB698</a:t>
+              <a:t>December 3, 2019</a:t>
             </a:r>
           </a:p>
         </p:txBody>
@@ -3712,14 +3707,14 @@
           <a:p>
             <a:r>
               <a:rPr lang="en-US" dirty="0"/>
-              <a:t>Results- in table</a:t>
-            </a:r>
-          </a:p>
-        </p:txBody>
-      </p:sp>
-      <p:sp>
-        <p:nvSpPr>
-          <p:cNvPr id="6" name="Content Placeholder 5"/>
+              <a:t>Results – in text, table, or figures</a:t>
+            </a:r>
+          </a:p>
+        </p:txBody>
+      </p:sp>
+      <p:sp>
+        <p:nvSpPr>
+          <p:cNvPr id="3" name="Content Placeholder 2"/>
           <p:cNvSpPr>
             <a:spLocks noGrp="1"/>
           </p:cNvSpPr>
@@ -3727,62 +3722,55 @@
             <p:ph idx="1"/>
           </p:nvPr>
         </p:nvSpPr>
-        <p:spPr>
-          <a:xfrm>
-            <a:off x="457200" y="1371600"/>
-            <a:ext cx="8229600" cy="5105400"/>
-          </a:xfrm>
-        </p:spPr>
+        <p:spPr/>
         <p:txBody>
           <a:bodyPr>
-            <a:normAutofit fontScale="92500" lnSpcReduction="10000"/>
+            <a:normAutofit/>
           </a:bodyPr>
           <a:lstStyle/>
           <a:p>
             <a:r>
               <a:rPr lang="en-US" dirty="0"/>
-              <a:t>For single model: </a:t>
+              <a:t>For LM report </a:t>
+            </a:r>
+            <a:r>
+              <a:rPr lang="en-US" b="1" dirty="0"/>
+              <a:t>all</a:t>
+            </a:r>
+            <a:r>
+              <a:rPr lang="en-US" dirty="0"/>
+              <a:t> F and p values if even non-significant.</a:t>
             </a:r>
           </a:p>
           <a:p>
             <a:pPr lvl="1"/>
             <a:r>
-              <a:rPr lang="en-US" dirty="0"/>
-              <a:t>Present estimated parameters, standard errors, degrees of freedom (if available) </a:t>
-            </a:r>
-          </a:p>
-          <a:p>
-            <a:pPr lvl="2"/>
-            <a:r>
-              <a:rPr lang="en-US" dirty="0"/>
-              <a:t>Maybe t-values, and p-values of optimal model, but not clear on how to get these values from mixed effects models. </a:t>
-            </a:r>
-          </a:p>
-          <a:p>
-            <a:pPr lvl="2"/>
-            <a:r>
-              <a:rPr lang="en-US" dirty="0"/>
-              <a:t>May be difficult to get degrees of freedom from mixed effects models</a:t>
-            </a:r>
-          </a:p>
-          <a:p>
-            <a:r>
-              <a:rPr lang="en-US" dirty="0"/>
-              <a:t>For model selection: </a:t>
-            </a:r>
-          </a:p>
-          <a:p>
-            <a:pPr lvl="1"/>
-            <a:r>
-              <a:rPr lang="en-US" dirty="0"/>
-              <a:t>Table showing model rankings with log likelihoods, AIC’s, maybe delta AIC’s.  </a:t>
-            </a:r>
-          </a:p>
-          <a:p>
-            <a:pPr lvl="1"/>
-            <a:r>
-              <a:rPr lang="en-US" dirty="0"/>
-              <a:t>Whether or not to present intermediate models is a matter of preference, space</a:t>
+              <a:rPr lang="en-US" b="1" dirty="0"/>
+              <a:t>Text: </a:t>
+            </a:r>
+            <a:r>
+              <a:rPr lang="en-US" dirty="0"/>
+              <a:t>(Test Name, F = all values , p = all values)</a:t>
+            </a:r>
+          </a:p>
+          <a:p>
+            <a:r>
+              <a:rPr lang="en-US" dirty="0"/>
+              <a:t>If use Likelihood Ratio Test to test whether something is significant, report p-value (chi symbol with </a:t>
+            </a:r>
+            <a:r>
+              <a:rPr lang="en-US" dirty="0" err="1"/>
+              <a:t>df</a:t>
+            </a:r>
+            <a:r>
+              <a:rPr lang="en-US" dirty="0"/>
+              <a:t>, LRT, and p-value)</a:t>
+            </a:r>
+          </a:p>
+          <a:p>
+            <a:r>
+              <a:rPr lang="en-US" dirty="0"/>
+              <a:t>P values are more informative than symbols such as * and **</a:t>
             </a:r>
           </a:p>
         </p:txBody>
@@ -3796,6 +3784,116 @@
 </file>
 
 <file path=ppt/slides/slide11.xml><?xml version="1.0" encoding="utf-8"?>
+<p:sld xmlns:a="http://schemas.openxmlformats.org/drawingml/2006/main" xmlns:r="http://schemas.openxmlformats.org/officeDocument/2006/relationships" xmlns:p="http://schemas.openxmlformats.org/presentationml/2006/main">
+  <p:cSld>
+    <p:spTree>
+      <p:nvGrpSpPr>
+        <p:cNvPr id="1" name=""/>
+        <p:cNvGrpSpPr/>
+        <p:nvPr/>
+      </p:nvGrpSpPr>
+      <p:grpSpPr>
+        <a:xfrm>
+          <a:off x="0" y="0"/>
+          <a:ext cx="0" cy="0"/>
+          <a:chOff x="0" y="0"/>
+          <a:chExt cx="0" cy="0"/>
+        </a:xfrm>
+      </p:grpSpPr>
+      <p:sp>
+        <p:nvSpPr>
+          <p:cNvPr id="2" name="Title 1"/>
+          <p:cNvSpPr>
+            <a:spLocks noGrp="1"/>
+          </p:cNvSpPr>
+          <p:nvPr>
+            <p:ph type="title"/>
+          </p:nvPr>
+        </p:nvSpPr>
+        <p:spPr/>
+        <p:txBody>
+          <a:bodyPr/>
+          <a:lstStyle/>
+          <a:p>
+            <a:r>
+              <a:rPr lang="en-US" dirty="0"/>
+              <a:t>Results- in table</a:t>
+            </a:r>
+          </a:p>
+        </p:txBody>
+      </p:sp>
+      <p:sp>
+        <p:nvSpPr>
+          <p:cNvPr id="6" name="Content Placeholder 5"/>
+          <p:cNvSpPr>
+            <a:spLocks noGrp="1"/>
+          </p:cNvSpPr>
+          <p:nvPr>
+            <p:ph idx="1"/>
+          </p:nvPr>
+        </p:nvSpPr>
+        <p:spPr>
+          <a:xfrm>
+            <a:off x="457200" y="1371600"/>
+            <a:ext cx="8229600" cy="5105400"/>
+          </a:xfrm>
+        </p:spPr>
+        <p:txBody>
+          <a:bodyPr>
+            <a:normAutofit/>
+          </a:bodyPr>
+          <a:lstStyle/>
+          <a:p>
+            <a:r>
+              <a:rPr lang="en-US" dirty="0"/>
+              <a:t>For single model: </a:t>
+            </a:r>
+          </a:p>
+          <a:p>
+            <a:pPr lvl="1"/>
+            <a:r>
+              <a:rPr lang="en-US" dirty="0"/>
+              <a:t>Present estimated parameters, standard errors, degrees of freedom (if available) </a:t>
+            </a:r>
+          </a:p>
+          <a:p>
+            <a:pPr lvl="2"/>
+            <a:r>
+              <a:rPr lang="en-US" dirty="0"/>
+              <a:t>May be difficult to get degrees of freedom from mixed effects models</a:t>
+            </a:r>
+          </a:p>
+          <a:p>
+            <a:r>
+              <a:rPr lang="en-US" dirty="0"/>
+              <a:t>For model selection: </a:t>
+            </a:r>
+          </a:p>
+          <a:p>
+            <a:pPr lvl="1"/>
+            <a:r>
+              <a:rPr lang="en-US" dirty="0"/>
+              <a:t>Table showing model rankings with log likelihoods, AIC’s, maybe delta AIC’s.  </a:t>
+            </a:r>
+          </a:p>
+          <a:p>
+            <a:pPr lvl="1"/>
+            <a:r>
+              <a:rPr lang="en-US" dirty="0"/>
+              <a:t>Whether or not to present intermediate models is a matter of preference, space</a:t>
+            </a:r>
+          </a:p>
+        </p:txBody>
+      </p:sp>
+    </p:spTree>
+  </p:cSld>
+  <p:clrMapOvr>
+    <a:masterClrMapping/>
+  </p:clrMapOvr>
+</p:sld>
+</file>
+
+<file path=ppt/slides/slide12.xml><?xml version="1.0" encoding="utf-8"?>
 <p:sld xmlns:a="http://schemas.openxmlformats.org/drawingml/2006/main" xmlns:r="http://schemas.openxmlformats.org/officeDocument/2006/relationships" xmlns:p="http://schemas.openxmlformats.org/presentationml/2006/main">
   <p:cSld>
     <p:spTree>
@@ -3927,7 +4025,7 @@
           <a:p>
             <a:r>
               <a:rPr lang="en-US" dirty="0"/>
-              <a:t>Assess methods &amp; results section of published papers</a:t>
+              <a:t>Exercise: Assess methods &amp; results section of published papers</a:t>
             </a:r>
           </a:p>
         </p:txBody>
@@ -3953,27 +4051,30 @@
           <a:bodyPr/>
           <a:lstStyle/>
           <a:p>
-            <a:r>
-              <a:rPr lang="en-US" dirty="0"/>
-              <a:t>Look at your paper</a:t>
-            </a:r>
-          </a:p>
-          <a:p>
-            <a:pPr lvl="1"/>
+            <a:pPr marL="571500" indent="-514350">
+              <a:buFont typeface="+mj-lt"/>
+              <a:buAutoNum type="arabicPeriod"/>
+            </a:pPr>
             <a:r>
               <a:rPr lang="en-US" dirty="0"/>
               <a:t>Read the abstract and last paragraph of the introduction to get a sense of what they did. </a:t>
             </a:r>
           </a:p>
           <a:p>
-            <a:pPr lvl="1"/>
+            <a:pPr marL="571500" indent="-514350">
+              <a:buFont typeface="+mj-lt"/>
+              <a:buAutoNum type="arabicPeriod"/>
+            </a:pPr>
             <a:r>
               <a:rPr lang="en-US" dirty="0"/>
               <a:t>Find where they report statistical approach in the methods. </a:t>
             </a:r>
           </a:p>
           <a:p>
-            <a:pPr lvl="1"/>
+            <a:pPr marL="571500" indent="-514350">
+              <a:buFont typeface="+mj-lt"/>
+              <a:buAutoNum type="arabicPeriod"/>
+            </a:pPr>
             <a:r>
               <a:rPr lang="en-US" dirty="0"/>
               <a:t>Find any tables with statistical results (may need to go online for supplemental info)</a:t>
@@ -4074,7 +4175,13 @@
           <a:p>
             <a:r>
               <a:rPr lang="en-US" dirty="0"/>
-              <a:t>Can be in a single section at end of methods, or interspersed throughout methods if there are several different components of the study with different statistical approaches. </a:t>
+              <a:t>Statistical analysis can be in a single section at end of methods, or interspersed throughout methods if there are several different components of the study with different statistical approaches.</a:t>
+            </a:r>
+          </a:p>
+          <a:p>
+            <a:r>
+              <a:rPr lang="en-US" dirty="0"/>
+              <a:t>Typically, use past tense. Can be active or passive voice.  </a:t>
             </a:r>
           </a:p>
           <a:p>
@@ -4093,7 +4200,7 @@
             <a:pPr lvl="1"/>
             <a:r>
               <a:rPr lang="en-US" dirty="0"/>
-              <a:t>Which hypothesis you are testing</a:t>
+              <a:t>Which hypothesis you are testing with a given analysis</a:t>
             </a:r>
           </a:p>
           <a:p>
@@ -4121,6 +4228,13 @@
             <a:pPr lvl="1"/>
             <a:r>
               <a:rPr lang="en-US" dirty="0"/>
+              <a:t>Assessment of model fit</a:t>
+            </a:r>
+          </a:p>
+          <a:p>
+            <a:pPr lvl="1"/>
+            <a:r>
+              <a:rPr lang="en-US" dirty="0"/>
               <a:t>Method of inference (e.g. p-values from full model or reduced model, post-hoc tests, likelihood ratio test, model selection via AIC)</a:t>
             </a:r>
           </a:p>
@@ -4129,20 +4243,6 @@
             <a:r>
               <a:rPr lang="en-US" dirty="0"/>
               <a:t>Explanation of any aberrations from standard process (e.g. how you dealt with outliers, missing data, correlated predictors, etc.)</a:t>
-            </a:r>
-          </a:p>
-          <a:p>
-            <a:pPr lvl="1"/>
-            <a:r>
-              <a:rPr lang="en-US" dirty="0"/>
-              <a:t>Assessment of model fit</a:t>
-            </a:r>
-          </a:p>
-          <a:p>
-            <a:pPr lvl="1"/>
-            <a:r>
-              <a:rPr lang="en-US" dirty="0"/>
-              <a:t>Details on how figures/graphs were made</a:t>
             </a:r>
           </a:p>
         </p:txBody>
@@ -4157,6 +4257,477 @@
   <p:clrMapOvr>
     <a:masterClrMapping/>
   </p:clrMapOvr>
+  <p:timing>
+    <p:tnLst>
+      <p:par>
+        <p:cTn id="1" dur="indefinite" restart="never" nodeType="tmRoot">
+          <p:childTnLst>
+            <p:seq concurrent="1" nextAc="seek">
+              <p:cTn id="2" dur="indefinite" nodeType="mainSeq">
+                <p:childTnLst>
+                  <p:par>
+                    <p:cTn id="3" fill="hold">
+                      <p:stCondLst>
+                        <p:cond delay="indefinite"/>
+                      </p:stCondLst>
+                      <p:childTnLst>
+                        <p:par>
+                          <p:cTn id="4" fill="hold">
+                            <p:stCondLst>
+                              <p:cond delay="0"/>
+                            </p:stCondLst>
+                            <p:childTnLst>
+                              <p:par>
+                                <p:cTn id="5" presetID="1" presetClass="entr" presetSubtype="0" fill="hold" nodeType="clickEffect">
+                                  <p:stCondLst>
+                                    <p:cond delay="0"/>
+                                  </p:stCondLst>
+                                  <p:childTnLst>
+                                    <p:set>
+                                      <p:cBhvr>
+                                        <p:cTn id="6" dur="1" fill="hold">
+                                          <p:stCondLst>
+                                            <p:cond delay="0"/>
+                                          </p:stCondLst>
+                                        </p:cTn>
+                                        <p:tgtEl>
+                                          <p:spTgt spid="3">
+                                            <p:txEl>
+                                              <p:pRg st="2" end="2"/>
+                                            </p:txEl>
+                                          </p:spTgt>
+                                        </p:tgtEl>
+                                        <p:attrNameLst>
+                                          <p:attrName>style.visibility</p:attrName>
+                                        </p:attrNameLst>
+                                      </p:cBhvr>
+                                      <p:to>
+                                        <p:strVal val="visible"/>
+                                      </p:to>
+                                    </p:set>
+                                  </p:childTnLst>
+                                </p:cTn>
+                              </p:par>
+                            </p:childTnLst>
+                          </p:cTn>
+                        </p:par>
+                      </p:childTnLst>
+                    </p:cTn>
+                  </p:par>
+                  <p:par>
+                    <p:cTn id="7" fill="hold">
+                      <p:stCondLst>
+                        <p:cond delay="indefinite"/>
+                      </p:stCondLst>
+                      <p:childTnLst>
+                        <p:par>
+                          <p:cTn id="8" fill="hold">
+                            <p:stCondLst>
+                              <p:cond delay="0"/>
+                            </p:stCondLst>
+                            <p:childTnLst>
+                              <p:par>
+                                <p:cTn id="9" presetID="1" presetClass="entr" presetSubtype="0" fill="hold" nodeType="clickEffect">
+                                  <p:stCondLst>
+                                    <p:cond delay="0"/>
+                                  </p:stCondLst>
+                                  <p:childTnLst>
+                                    <p:set>
+                                      <p:cBhvr>
+                                        <p:cTn id="10" dur="1" fill="hold">
+                                          <p:stCondLst>
+                                            <p:cond delay="0"/>
+                                          </p:stCondLst>
+                                        </p:cTn>
+                                        <p:tgtEl>
+                                          <p:spTgt spid="3">
+                                            <p:txEl>
+                                              <p:pRg st="3" end="3"/>
+                                            </p:txEl>
+                                          </p:spTgt>
+                                        </p:tgtEl>
+                                        <p:attrNameLst>
+                                          <p:attrName>style.visibility</p:attrName>
+                                        </p:attrNameLst>
+                                      </p:cBhvr>
+                                      <p:to>
+                                        <p:strVal val="visible"/>
+                                      </p:to>
+                                    </p:set>
+                                  </p:childTnLst>
+                                </p:cTn>
+                              </p:par>
+                            </p:childTnLst>
+                          </p:cTn>
+                        </p:par>
+                      </p:childTnLst>
+                    </p:cTn>
+                  </p:par>
+                  <p:par>
+                    <p:cTn id="11" fill="hold">
+                      <p:stCondLst>
+                        <p:cond delay="indefinite"/>
+                      </p:stCondLst>
+                      <p:childTnLst>
+                        <p:par>
+                          <p:cTn id="12" fill="hold">
+                            <p:stCondLst>
+                              <p:cond delay="0"/>
+                            </p:stCondLst>
+                            <p:childTnLst>
+                              <p:par>
+                                <p:cTn id="13" presetID="1" presetClass="entr" presetSubtype="0" fill="hold" nodeType="clickEffect">
+                                  <p:stCondLst>
+                                    <p:cond delay="0"/>
+                                  </p:stCondLst>
+                                  <p:childTnLst>
+                                    <p:set>
+                                      <p:cBhvr>
+                                        <p:cTn id="14" dur="1" fill="hold">
+                                          <p:stCondLst>
+                                            <p:cond delay="0"/>
+                                          </p:stCondLst>
+                                        </p:cTn>
+                                        <p:tgtEl>
+                                          <p:spTgt spid="3">
+                                            <p:txEl>
+                                              <p:pRg st="4" end="4"/>
+                                            </p:txEl>
+                                          </p:spTgt>
+                                        </p:tgtEl>
+                                        <p:attrNameLst>
+                                          <p:attrName>style.visibility</p:attrName>
+                                        </p:attrNameLst>
+                                      </p:cBhvr>
+                                      <p:to>
+                                        <p:strVal val="visible"/>
+                                      </p:to>
+                                    </p:set>
+                                  </p:childTnLst>
+                                </p:cTn>
+                              </p:par>
+                            </p:childTnLst>
+                          </p:cTn>
+                        </p:par>
+                      </p:childTnLst>
+                    </p:cTn>
+                  </p:par>
+                  <p:par>
+                    <p:cTn id="15" fill="hold">
+                      <p:stCondLst>
+                        <p:cond delay="indefinite"/>
+                      </p:stCondLst>
+                      <p:childTnLst>
+                        <p:par>
+                          <p:cTn id="16" fill="hold">
+                            <p:stCondLst>
+                              <p:cond delay="0"/>
+                            </p:stCondLst>
+                            <p:childTnLst>
+                              <p:par>
+                                <p:cTn id="17" presetID="1" presetClass="entr" presetSubtype="0" fill="hold" nodeType="clickEffect">
+                                  <p:stCondLst>
+                                    <p:cond delay="0"/>
+                                  </p:stCondLst>
+                                  <p:childTnLst>
+                                    <p:set>
+                                      <p:cBhvr>
+                                        <p:cTn id="18" dur="1" fill="hold">
+                                          <p:stCondLst>
+                                            <p:cond delay="0"/>
+                                          </p:stCondLst>
+                                        </p:cTn>
+                                        <p:tgtEl>
+                                          <p:spTgt spid="3">
+                                            <p:txEl>
+                                              <p:pRg st="5" end="5"/>
+                                            </p:txEl>
+                                          </p:spTgt>
+                                        </p:tgtEl>
+                                        <p:attrNameLst>
+                                          <p:attrName>style.visibility</p:attrName>
+                                        </p:attrNameLst>
+                                      </p:cBhvr>
+                                      <p:to>
+                                        <p:strVal val="visible"/>
+                                      </p:to>
+                                    </p:set>
+                                  </p:childTnLst>
+                                </p:cTn>
+                              </p:par>
+                            </p:childTnLst>
+                          </p:cTn>
+                        </p:par>
+                      </p:childTnLst>
+                    </p:cTn>
+                  </p:par>
+                  <p:par>
+                    <p:cTn id="19" fill="hold">
+                      <p:stCondLst>
+                        <p:cond delay="indefinite"/>
+                      </p:stCondLst>
+                      <p:childTnLst>
+                        <p:par>
+                          <p:cTn id="20" fill="hold">
+                            <p:stCondLst>
+                              <p:cond delay="0"/>
+                            </p:stCondLst>
+                            <p:childTnLst>
+                              <p:par>
+                                <p:cTn id="21" presetID="1" presetClass="entr" presetSubtype="0" fill="hold" nodeType="clickEffect">
+                                  <p:stCondLst>
+                                    <p:cond delay="0"/>
+                                  </p:stCondLst>
+                                  <p:childTnLst>
+                                    <p:set>
+                                      <p:cBhvr>
+                                        <p:cTn id="22" dur="1" fill="hold">
+                                          <p:stCondLst>
+                                            <p:cond delay="0"/>
+                                          </p:stCondLst>
+                                        </p:cTn>
+                                        <p:tgtEl>
+                                          <p:spTgt spid="3">
+                                            <p:txEl>
+                                              <p:pRg st="6" end="6"/>
+                                            </p:txEl>
+                                          </p:spTgt>
+                                        </p:tgtEl>
+                                        <p:attrNameLst>
+                                          <p:attrName>style.visibility</p:attrName>
+                                        </p:attrNameLst>
+                                      </p:cBhvr>
+                                      <p:to>
+                                        <p:strVal val="visible"/>
+                                      </p:to>
+                                    </p:set>
+                                  </p:childTnLst>
+                                </p:cTn>
+                              </p:par>
+                            </p:childTnLst>
+                          </p:cTn>
+                        </p:par>
+                      </p:childTnLst>
+                    </p:cTn>
+                  </p:par>
+                  <p:par>
+                    <p:cTn id="23" fill="hold">
+                      <p:stCondLst>
+                        <p:cond delay="indefinite"/>
+                      </p:stCondLst>
+                      <p:childTnLst>
+                        <p:par>
+                          <p:cTn id="24" fill="hold">
+                            <p:stCondLst>
+                              <p:cond delay="0"/>
+                            </p:stCondLst>
+                            <p:childTnLst>
+                              <p:par>
+                                <p:cTn id="25" presetID="1" presetClass="entr" presetSubtype="0" fill="hold" nodeType="clickEffect">
+                                  <p:stCondLst>
+                                    <p:cond delay="0"/>
+                                  </p:stCondLst>
+                                  <p:childTnLst>
+                                    <p:set>
+                                      <p:cBhvr>
+                                        <p:cTn id="26" dur="1" fill="hold">
+                                          <p:stCondLst>
+                                            <p:cond delay="0"/>
+                                          </p:stCondLst>
+                                        </p:cTn>
+                                        <p:tgtEl>
+                                          <p:spTgt spid="3">
+                                            <p:txEl>
+                                              <p:pRg st="7" end="7"/>
+                                            </p:txEl>
+                                          </p:spTgt>
+                                        </p:tgtEl>
+                                        <p:attrNameLst>
+                                          <p:attrName>style.visibility</p:attrName>
+                                        </p:attrNameLst>
+                                      </p:cBhvr>
+                                      <p:to>
+                                        <p:strVal val="visible"/>
+                                      </p:to>
+                                    </p:set>
+                                  </p:childTnLst>
+                                </p:cTn>
+                              </p:par>
+                            </p:childTnLst>
+                          </p:cTn>
+                        </p:par>
+                      </p:childTnLst>
+                    </p:cTn>
+                  </p:par>
+                  <p:par>
+                    <p:cTn id="27" fill="hold">
+                      <p:stCondLst>
+                        <p:cond delay="indefinite"/>
+                      </p:stCondLst>
+                      <p:childTnLst>
+                        <p:par>
+                          <p:cTn id="28" fill="hold">
+                            <p:stCondLst>
+                              <p:cond delay="0"/>
+                            </p:stCondLst>
+                            <p:childTnLst>
+                              <p:par>
+                                <p:cTn id="29" presetID="1" presetClass="entr" presetSubtype="0" fill="hold" nodeType="clickEffect">
+                                  <p:stCondLst>
+                                    <p:cond delay="0"/>
+                                  </p:stCondLst>
+                                  <p:childTnLst>
+                                    <p:set>
+                                      <p:cBhvr>
+                                        <p:cTn id="30" dur="1" fill="hold">
+                                          <p:stCondLst>
+                                            <p:cond delay="0"/>
+                                          </p:stCondLst>
+                                        </p:cTn>
+                                        <p:tgtEl>
+                                          <p:spTgt spid="3">
+                                            <p:txEl>
+                                              <p:pRg st="8" end="8"/>
+                                            </p:txEl>
+                                          </p:spTgt>
+                                        </p:tgtEl>
+                                        <p:attrNameLst>
+                                          <p:attrName>style.visibility</p:attrName>
+                                        </p:attrNameLst>
+                                      </p:cBhvr>
+                                      <p:to>
+                                        <p:strVal val="visible"/>
+                                      </p:to>
+                                    </p:set>
+                                  </p:childTnLst>
+                                </p:cTn>
+                              </p:par>
+                            </p:childTnLst>
+                          </p:cTn>
+                        </p:par>
+                      </p:childTnLst>
+                    </p:cTn>
+                  </p:par>
+                  <p:par>
+                    <p:cTn id="31" fill="hold">
+                      <p:stCondLst>
+                        <p:cond delay="indefinite"/>
+                      </p:stCondLst>
+                      <p:childTnLst>
+                        <p:par>
+                          <p:cTn id="32" fill="hold">
+                            <p:stCondLst>
+                              <p:cond delay="0"/>
+                            </p:stCondLst>
+                            <p:childTnLst>
+                              <p:par>
+                                <p:cTn id="33" presetID="1" presetClass="entr" presetSubtype="0" fill="hold" nodeType="clickEffect">
+                                  <p:stCondLst>
+                                    <p:cond delay="0"/>
+                                  </p:stCondLst>
+                                  <p:childTnLst>
+                                    <p:set>
+                                      <p:cBhvr>
+                                        <p:cTn id="34" dur="1" fill="hold">
+                                          <p:stCondLst>
+                                            <p:cond delay="0"/>
+                                          </p:stCondLst>
+                                        </p:cTn>
+                                        <p:tgtEl>
+                                          <p:spTgt spid="3">
+                                            <p:txEl>
+                                              <p:pRg st="9" end="9"/>
+                                            </p:txEl>
+                                          </p:spTgt>
+                                        </p:tgtEl>
+                                        <p:attrNameLst>
+                                          <p:attrName>style.visibility</p:attrName>
+                                        </p:attrNameLst>
+                                      </p:cBhvr>
+                                      <p:to>
+                                        <p:strVal val="visible"/>
+                                      </p:to>
+                                    </p:set>
+                                  </p:childTnLst>
+                                </p:cTn>
+                              </p:par>
+                            </p:childTnLst>
+                          </p:cTn>
+                        </p:par>
+                      </p:childTnLst>
+                    </p:cTn>
+                  </p:par>
+                  <p:par>
+                    <p:cTn id="35" fill="hold">
+                      <p:stCondLst>
+                        <p:cond delay="indefinite"/>
+                      </p:stCondLst>
+                      <p:childTnLst>
+                        <p:par>
+                          <p:cTn id="36" fill="hold">
+                            <p:stCondLst>
+                              <p:cond delay="0"/>
+                            </p:stCondLst>
+                            <p:childTnLst>
+                              <p:par>
+                                <p:cTn id="37" presetID="1" presetClass="entr" presetSubtype="0" fill="hold" nodeType="clickEffect">
+                                  <p:stCondLst>
+                                    <p:cond delay="0"/>
+                                  </p:stCondLst>
+                                  <p:childTnLst>
+                                    <p:set>
+                                      <p:cBhvr>
+                                        <p:cTn id="38" dur="1" fill="hold">
+                                          <p:stCondLst>
+                                            <p:cond delay="0"/>
+                                          </p:stCondLst>
+                                        </p:cTn>
+                                        <p:tgtEl>
+                                          <p:spTgt spid="3">
+                                            <p:txEl>
+                                              <p:pRg st="10" end="10"/>
+                                            </p:txEl>
+                                          </p:spTgt>
+                                        </p:tgtEl>
+                                        <p:attrNameLst>
+                                          <p:attrName>style.visibility</p:attrName>
+                                        </p:attrNameLst>
+                                      </p:cBhvr>
+                                      <p:to>
+                                        <p:strVal val="visible"/>
+                                      </p:to>
+                                    </p:set>
+                                  </p:childTnLst>
+                                </p:cTn>
+                              </p:par>
+                            </p:childTnLst>
+                          </p:cTn>
+                        </p:par>
+                      </p:childTnLst>
+                    </p:cTn>
+                  </p:par>
+                </p:childTnLst>
+              </p:cTn>
+              <p:prevCondLst>
+                <p:cond evt="onPrev" delay="0">
+                  <p:tgtEl>
+                    <p:sldTgt/>
+                  </p:tgtEl>
+                </p:cond>
+              </p:prevCondLst>
+              <p:nextCondLst>
+                <p:cond evt="onNext" delay="0">
+                  <p:tgtEl>
+                    <p:sldTgt/>
+                  </p:tgtEl>
+                </p:cond>
+              </p:nextCondLst>
+            </p:seq>
+          </p:childTnLst>
+        </p:cTn>
+      </p:par>
+    </p:tnLst>
+  </p:timing>
 </p:sld>
 </file>
 
@@ -4218,13 +4789,13 @@
         </p:nvSpPr>
         <p:spPr>
           <a:xfrm>
-            <a:off x="0" y="1371600"/>
+            <a:off x="0" y="1219200"/>
             <a:ext cx="9144000" cy="5715000"/>
           </a:xfrm>
         </p:spPr>
         <p:txBody>
           <a:bodyPr>
-            <a:normAutofit fontScale="62500" lnSpcReduction="20000"/>
+            <a:normAutofit fontScale="70000" lnSpcReduction="20000"/>
           </a:bodyPr>
           <a:lstStyle/>
           <a:p>
@@ -4310,58 +4881,7 @@
             </a:pPr>
             <a:r>
               <a:rPr lang="en-US" dirty="0"/>
-              <a:t>Describe how you approached model selection and/or hypothesis testing</a:t>
-            </a:r>
-          </a:p>
-          <a:p>
-            <a:pPr marL="914400" lvl="1" indent="-514350"/>
-            <a:r>
-              <a:rPr lang="en-US" dirty="0"/>
-              <a:t>If you used model selection:</a:t>
-            </a:r>
-          </a:p>
-          <a:p>
-            <a:pPr marL="1314450" lvl="2" indent="-514350"/>
-            <a:r>
-              <a:rPr lang="en-US" dirty="0"/>
-              <a:t>Describe alternative models you fit to data (if appropriate)</a:t>
-            </a:r>
-          </a:p>
-          <a:p>
-            <a:pPr marL="1314450" lvl="2" indent="-514350"/>
-            <a:r>
-              <a:rPr lang="en-US" dirty="0"/>
-              <a:t>Outline protocol for model selection (e.g. AIC, likelihood ratio test)</a:t>
-            </a:r>
-          </a:p>
-          <a:p>
-            <a:pPr marL="914400" lvl="1" indent="-514350"/>
-            <a:r>
-              <a:rPr lang="en-US" dirty="0"/>
-              <a:t>If you used post-hoc analyses (e.g. </a:t>
-            </a:r>
-            <a:r>
-              <a:rPr lang="en-US" dirty="0" err="1"/>
-              <a:t>lsmeans</a:t>
-            </a:r>
-            <a:r>
-              <a:rPr lang="en-US" dirty="0"/>
-              <a:t>, </a:t>
-            </a:r>
-            <a:r>
-              <a:rPr lang="en-US" dirty="0" err="1"/>
-              <a:t>glht</a:t>
-            </a:r>
-            <a:r>
-              <a:rPr lang="en-US" dirty="0"/>
-              <a:t>): </a:t>
-            </a:r>
-          </a:p>
-          <a:p>
-            <a:pPr marL="1314450" lvl="2" indent="-514350"/>
-            <a:r>
-              <a:rPr lang="en-US" dirty="0"/>
-              <a:t>Describe what you used. </a:t>
+              <a:t>Describe methods you used to assess model adequacy</a:t>
             </a:r>
           </a:p>
           <a:p>
@@ -4371,15 +4891,58 @@
             </a:pPr>
             <a:r>
               <a:rPr lang="en-US" dirty="0"/>
-              <a:t>Mention how you dealt with </a:t>
+              <a:t>Describe how you approached model selection and/or hypothesis testing</a:t>
+            </a:r>
+          </a:p>
+          <a:p>
+            <a:pPr marL="914400" lvl="1" indent="-514350"/>
+            <a:r>
+              <a:rPr lang="en-US" dirty="0"/>
+              <a:t>If you used model selection:</a:t>
+            </a:r>
+          </a:p>
+          <a:p>
+            <a:pPr marL="1314450" lvl="2" indent="-514350"/>
+            <a:r>
+              <a:rPr lang="en-US" dirty="0"/>
+              <a:t>Describe alternative models you fit to data (if appropriate)</a:t>
+            </a:r>
+          </a:p>
+          <a:p>
+            <a:pPr marL="1314450" lvl="2" indent="-514350"/>
+            <a:r>
+              <a:rPr lang="en-US" dirty="0"/>
+              <a:t>Outline protocol for model selection (e.g. AIC, likelihood ratio test)</a:t>
+            </a:r>
+          </a:p>
+          <a:p>
+            <a:pPr marL="914400" lvl="1" indent="-514350"/>
+            <a:r>
+              <a:rPr lang="en-US" dirty="0"/>
+              <a:t>If you used post-hoc analyses (e.g. </a:t>
             </a:r>
             <a:r>
               <a:rPr lang="en-US" dirty="0" err="1"/>
-              <a:t>overdispersion</a:t>
-            </a:r>
-            <a:r>
-              <a:rPr lang="en-US" dirty="0"/>
-              <a:t>, if relevant.</a:t>
+              <a:t>lsmeans</a:t>
+            </a:r>
+            <a:r>
+              <a:rPr lang="en-US" dirty="0"/>
+              <a:t>, </a:t>
+            </a:r>
+            <a:r>
+              <a:rPr lang="en-US" dirty="0" err="1"/>
+              <a:t>glht</a:t>
+            </a:r>
+            <a:r>
+              <a:rPr lang="en-US" dirty="0"/>
+              <a:t>): </a:t>
+            </a:r>
+          </a:p>
+          <a:p>
+            <a:pPr marL="1314450" lvl="2" indent="-514350"/>
+            <a:r>
+              <a:rPr lang="en-US" dirty="0"/>
+              <a:t>Describe what you used. </a:t>
             </a:r>
           </a:p>
           <a:p>
@@ -4389,14 +4952,15 @@
             </a:pPr>
             <a:r>
               <a:rPr lang="en-US" dirty="0"/>
-              <a:t>Describe methods you used to assess model adequacy</a:t>
-            </a:r>
-          </a:p>
-          <a:p>
-            <a:pPr marL="914400" lvl="1" indent="-514350"/>
-            <a:r>
-              <a:rPr lang="en-US" dirty="0"/>
-              <a:t>e.g. plot residuals against fitted values, predictors etc.</a:t>
+              <a:t>Mention how you dealt with </a:t>
+            </a:r>
+            <a:r>
+              <a:rPr lang="en-US" dirty="0" err="1"/>
+              <a:t>overdispersion</a:t>
+            </a:r>
+            <a:r>
+              <a:rPr lang="en-US" dirty="0"/>
+              <a:t>, if relevant.</a:t>
             </a:r>
           </a:p>
           <a:p>
@@ -4426,6 +4990,820 @@
   <p:clrMapOvr>
     <a:masterClrMapping/>
   </p:clrMapOvr>
+  <p:timing>
+    <p:tnLst>
+      <p:par>
+        <p:cTn id="1" dur="indefinite" restart="never" nodeType="tmRoot">
+          <p:childTnLst>
+            <p:seq concurrent="1" nextAc="seek">
+              <p:cTn id="2" dur="indefinite" nodeType="mainSeq">
+                <p:childTnLst>
+                  <p:par>
+                    <p:cTn id="3" fill="hold">
+                      <p:stCondLst>
+                        <p:cond delay="indefinite"/>
+                      </p:stCondLst>
+                      <p:childTnLst>
+                        <p:par>
+                          <p:cTn id="4" fill="hold">
+                            <p:stCondLst>
+                              <p:cond delay="0"/>
+                            </p:stCondLst>
+                            <p:childTnLst>
+                              <p:par>
+                                <p:cTn id="5" presetID="1" presetClass="entr" presetSubtype="0" fill="hold" nodeType="clickEffect">
+                                  <p:stCondLst>
+                                    <p:cond delay="0"/>
+                                  </p:stCondLst>
+                                  <p:childTnLst>
+                                    <p:set>
+                                      <p:cBhvr>
+                                        <p:cTn id="6" dur="1" fill="hold">
+                                          <p:stCondLst>
+                                            <p:cond delay="0"/>
+                                          </p:stCondLst>
+                                        </p:cTn>
+                                        <p:tgtEl>
+                                          <p:spTgt spid="5">
+                                            <p:txEl>
+                                              <p:pRg st="0" end="0"/>
+                                            </p:txEl>
+                                          </p:spTgt>
+                                        </p:tgtEl>
+                                        <p:attrNameLst>
+                                          <p:attrName>style.visibility</p:attrName>
+                                        </p:attrNameLst>
+                                      </p:cBhvr>
+                                      <p:to>
+                                        <p:strVal val="visible"/>
+                                      </p:to>
+                                    </p:set>
+                                  </p:childTnLst>
+                                </p:cTn>
+                              </p:par>
+                            </p:childTnLst>
+                          </p:cTn>
+                        </p:par>
+                      </p:childTnLst>
+                    </p:cTn>
+                  </p:par>
+                  <p:par>
+                    <p:cTn id="7" fill="hold">
+                      <p:stCondLst>
+                        <p:cond delay="indefinite"/>
+                      </p:stCondLst>
+                      <p:childTnLst>
+                        <p:par>
+                          <p:cTn id="8" fill="hold">
+                            <p:stCondLst>
+                              <p:cond delay="0"/>
+                            </p:stCondLst>
+                            <p:childTnLst>
+                              <p:par>
+                                <p:cTn id="9" presetID="1" presetClass="entr" presetSubtype="0" fill="hold" nodeType="clickEffect">
+                                  <p:stCondLst>
+                                    <p:cond delay="0"/>
+                                  </p:stCondLst>
+                                  <p:childTnLst>
+                                    <p:set>
+                                      <p:cBhvr>
+                                        <p:cTn id="10" dur="1" fill="hold">
+                                          <p:stCondLst>
+                                            <p:cond delay="0"/>
+                                          </p:stCondLst>
+                                        </p:cTn>
+                                        <p:tgtEl>
+                                          <p:spTgt spid="5">
+                                            <p:txEl>
+                                              <p:pRg st="1" end="1"/>
+                                            </p:txEl>
+                                          </p:spTgt>
+                                        </p:tgtEl>
+                                        <p:attrNameLst>
+                                          <p:attrName>style.visibility</p:attrName>
+                                        </p:attrNameLst>
+                                      </p:cBhvr>
+                                      <p:to>
+                                        <p:strVal val="visible"/>
+                                      </p:to>
+                                    </p:set>
+                                  </p:childTnLst>
+                                </p:cTn>
+                              </p:par>
+                            </p:childTnLst>
+                          </p:cTn>
+                        </p:par>
+                      </p:childTnLst>
+                    </p:cTn>
+                  </p:par>
+                  <p:par>
+                    <p:cTn id="11" fill="hold">
+                      <p:stCondLst>
+                        <p:cond delay="indefinite"/>
+                      </p:stCondLst>
+                      <p:childTnLst>
+                        <p:par>
+                          <p:cTn id="12" fill="hold">
+                            <p:stCondLst>
+                              <p:cond delay="0"/>
+                            </p:stCondLst>
+                            <p:childTnLst>
+                              <p:par>
+                                <p:cTn id="13" presetID="1" presetClass="entr" presetSubtype="0" fill="hold" nodeType="clickEffect">
+                                  <p:stCondLst>
+                                    <p:cond delay="0"/>
+                                  </p:stCondLst>
+                                  <p:childTnLst>
+                                    <p:set>
+                                      <p:cBhvr>
+                                        <p:cTn id="14" dur="1" fill="hold">
+                                          <p:stCondLst>
+                                            <p:cond delay="0"/>
+                                          </p:stCondLst>
+                                        </p:cTn>
+                                        <p:tgtEl>
+                                          <p:spTgt spid="5">
+                                            <p:txEl>
+                                              <p:pRg st="2" end="2"/>
+                                            </p:txEl>
+                                          </p:spTgt>
+                                        </p:tgtEl>
+                                        <p:attrNameLst>
+                                          <p:attrName>style.visibility</p:attrName>
+                                        </p:attrNameLst>
+                                      </p:cBhvr>
+                                      <p:to>
+                                        <p:strVal val="visible"/>
+                                      </p:to>
+                                    </p:set>
+                                  </p:childTnLst>
+                                </p:cTn>
+                              </p:par>
+                            </p:childTnLst>
+                          </p:cTn>
+                        </p:par>
+                      </p:childTnLst>
+                    </p:cTn>
+                  </p:par>
+                  <p:par>
+                    <p:cTn id="15" fill="hold">
+                      <p:stCondLst>
+                        <p:cond delay="indefinite"/>
+                      </p:stCondLst>
+                      <p:childTnLst>
+                        <p:par>
+                          <p:cTn id="16" fill="hold">
+                            <p:stCondLst>
+                              <p:cond delay="0"/>
+                            </p:stCondLst>
+                            <p:childTnLst>
+                              <p:par>
+                                <p:cTn id="17" presetID="1" presetClass="entr" presetSubtype="0" fill="hold" nodeType="clickEffect">
+                                  <p:stCondLst>
+                                    <p:cond delay="0"/>
+                                  </p:stCondLst>
+                                  <p:childTnLst>
+                                    <p:set>
+                                      <p:cBhvr>
+                                        <p:cTn id="18" dur="1" fill="hold">
+                                          <p:stCondLst>
+                                            <p:cond delay="0"/>
+                                          </p:stCondLst>
+                                        </p:cTn>
+                                        <p:tgtEl>
+                                          <p:spTgt spid="5">
+                                            <p:txEl>
+                                              <p:pRg st="3" end="3"/>
+                                            </p:txEl>
+                                          </p:spTgt>
+                                        </p:tgtEl>
+                                        <p:attrNameLst>
+                                          <p:attrName>style.visibility</p:attrName>
+                                        </p:attrNameLst>
+                                      </p:cBhvr>
+                                      <p:to>
+                                        <p:strVal val="visible"/>
+                                      </p:to>
+                                    </p:set>
+                                  </p:childTnLst>
+                                </p:cTn>
+                              </p:par>
+                            </p:childTnLst>
+                          </p:cTn>
+                        </p:par>
+                      </p:childTnLst>
+                    </p:cTn>
+                  </p:par>
+                  <p:par>
+                    <p:cTn id="19" fill="hold">
+                      <p:stCondLst>
+                        <p:cond delay="indefinite"/>
+                      </p:stCondLst>
+                      <p:childTnLst>
+                        <p:par>
+                          <p:cTn id="20" fill="hold">
+                            <p:stCondLst>
+                              <p:cond delay="0"/>
+                            </p:stCondLst>
+                            <p:childTnLst>
+                              <p:par>
+                                <p:cTn id="21" presetID="1" presetClass="entr" presetSubtype="0" fill="hold" nodeType="clickEffect">
+                                  <p:stCondLst>
+                                    <p:cond delay="0"/>
+                                  </p:stCondLst>
+                                  <p:childTnLst>
+                                    <p:set>
+                                      <p:cBhvr>
+                                        <p:cTn id="22" dur="1" fill="hold">
+                                          <p:stCondLst>
+                                            <p:cond delay="0"/>
+                                          </p:stCondLst>
+                                        </p:cTn>
+                                        <p:tgtEl>
+                                          <p:spTgt spid="5">
+                                            <p:txEl>
+                                              <p:pRg st="4" end="4"/>
+                                            </p:txEl>
+                                          </p:spTgt>
+                                        </p:tgtEl>
+                                        <p:attrNameLst>
+                                          <p:attrName>style.visibility</p:attrName>
+                                        </p:attrNameLst>
+                                      </p:cBhvr>
+                                      <p:to>
+                                        <p:strVal val="visible"/>
+                                      </p:to>
+                                    </p:set>
+                                  </p:childTnLst>
+                                </p:cTn>
+                              </p:par>
+                            </p:childTnLst>
+                          </p:cTn>
+                        </p:par>
+                      </p:childTnLst>
+                    </p:cTn>
+                  </p:par>
+                  <p:par>
+                    <p:cTn id="23" fill="hold">
+                      <p:stCondLst>
+                        <p:cond delay="indefinite"/>
+                      </p:stCondLst>
+                      <p:childTnLst>
+                        <p:par>
+                          <p:cTn id="24" fill="hold">
+                            <p:stCondLst>
+                              <p:cond delay="0"/>
+                            </p:stCondLst>
+                            <p:childTnLst>
+                              <p:par>
+                                <p:cTn id="25" presetID="1" presetClass="entr" presetSubtype="0" fill="hold" nodeType="clickEffect">
+                                  <p:stCondLst>
+                                    <p:cond delay="0"/>
+                                  </p:stCondLst>
+                                  <p:childTnLst>
+                                    <p:set>
+                                      <p:cBhvr>
+                                        <p:cTn id="26" dur="1" fill="hold">
+                                          <p:stCondLst>
+                                            <p:cond delay="0"/>
+                                          </p:stCondLst>
+                                        </p:cTn>
+                                        <p:tgtEl>
+                                          <p:spTgt spid="5">
+                                            <p:txEl>
+                                              <p:pRg st="5" end="5"/>
+                                            </p:txEl>
+                                          </p:spTgt>
+                                        </p:tgtEl>
+                                        <p:attrNameLst>
+                                          <p:attrName>style.visibility</p:attrName>
+                                        </p:attrNameLst>
+                                      </p:cBhvr>
+                                      <p:to>
+                                        <p:strVal val="visible"/>
+                                      </p:to>
+                                    </p:set>
+                                  </p:childTnLst>
+                                </p:cTn>
+                              </p:par>
+                            </p:childTnLst>
+                          </p:cTn>
+                        </p:par>
+                      </p:childTnLst>
+                    </p:cTn>
+                  </p:par>
+                  <p:par>
+                    <p:cTn id="27" fill="hold">
+                      <p:stCondLst>
+                        <p:cond delay="indefinite"/>
+                      </p:stCondLst>
+                      <p:childTnLst>
+                        <p:par>
+                          <p:cTn id="28" fill="hold">
+                            <p:stCondLst>
+                              <p:cond delay="0"/>
+                            </p:stCondLst>
+                            <p:childTnLst>
+                              <p:par>
+                                <p:cTn id="29" presetID="1" presetClass="entr" presetSubtype="0" fill="hold" nodeType="clickEffect">
+                                  <p:stCondLst>
+                                    <p:cond delay="0"/>
+                                  </p:stCondLst>
+                                  <p:childTnLst>
+                                    <p:set>
+                                      <p:cBhvr>
+                                        <p:cTn id="30" dur="1" fill="hold">
+                                          <p:stCondLst>
+                                            <p:cond delay="0"/>
+                                          </p:stCondLst>
+                                        </p:cTn>
+                                        <p:tgtEl>
+                                          <p:spTgt spid="5">
+                                            <p:txEl>
+                                              <p:pRg st="6" end="6"/>
+                                            </p:txEl>
+                                          </p:spTgt>
+                                        </p:tgtEl>
+                                        <p:attrNameLst>
+                                          <p:attrName>style.visibility</p:attrName>
+                                        </p:attrNameLst>
+                                      </p:cBhvr>
+                                      <p:to>
+                                        <p:strVal val="visible"/>
+                                      </p:to>
+                                    </p:set>
+                                  </p:childTnLst>
+                                </p:cTn>
+                              </p:par>
+                            </p:childTnLst>
+                          </p:cTn>
+                        </p:par>
+                      </p:childTnLst>
+                    </p:cTn>
+                  </p:par>
+                  <p:par>
+                    <p:cTn id="31" fill="hold">
+                      <p:stCondLst>
+                        <p:cond delay="indefinite"/>
+                      </p:stCondLst>
+                      <p:childTnLst>
+                        <p:par>
+                          <p:cTn id="32" fill="hold">
+                            <p:stCondLst>
+                              <p:cond delay="0"/>
+                            </p:stCondLst>
+                            <p:childTnLst>
+                              <p:par>
+                                <p:cTn id="33" presetID="1" presetClass="entr" presetSubtype="0" fill="hold" nodeType="clickEffect">
+                                  <p:stCondLst>
+                                    <p:cond delay="0"/>
+                                  </p:stCondLst>
+                                  <p:childTnLst>
+                                    <p:set>
+                                      <p:cBhvr>
+                                        <p:cTn id="34" dur="1" fill="hold">
+                                          <p:stCondLst>
+                                            <p:cond delay="0"/>
+                                          </p:stCondLst>
+                                        </p:cTn>
+                                        <p:tgtEl>
+                                          <p:spTgt spid="5">
+                                            <p:txEl>
+                                              <p:pRg st="7" end="7"/>
+                                            </p:txEl>
+                                          </p:spTgt>
+                                        </p:tgtEl>
+                                        <p:attrNameLst>
+                                          <p:attrName>style.visibility</p:attrName>
+                                        </p:attrNameLst>
+                                      </p:cBhvr>
+                                      <p:to>
+                                        <p:strVal val="visible"/>
+                                      </p:to>
+                                    </p:set>
+                                  </p:childTnLst>
+                                </p:cTn>
+                              </p:par>
+                            </p:childTnLst>
+                          </p:cTn>
+                        </p:par>
+                      </p:childTnLst>
+                    </p:cTn>
+                  </p:par>
+                  <p:par>
+                    <p:cTn id="35" fill="hold">
+                      <p:stCondLst>
+                        <p:cond delay="indefinite"/>
+                      </p:stCondLst>
+                      <p:childTnLst>
+                        <p:par>
+                          <p:cTn id="36" fill="hold">
+                            <p:stCondLst>
+                              <p:cond delay="0"/>
+                            </p:stCondLst>
+                            <p:childTnLst>
+                              <p:par>
+                                <p:cTn id="37" presetID="1" presetClass="entr" presetSubtype="0" fill="hold" nodeType="clickEffect">
+                                  <p:stCondLst>
+                                    <p:cond delay="0"/>
+                                  </p:stCondLst>
+                                  <p:childTnLst>
+                                    <p:set>
+                                      <p:cBhvr>
+                                        <p:cTn id="38" dur="1" fill="hold">
+                                          <p:stCondLst>
+                                            <p:cond delay="0"/>
+                                          </p:stCondLst>
+                                        </p:cTn>
+                                        <p:tgtEl>
+                                          <p:spTgt spid="5">
+                                            <p:txEl>
+                                              <p:pRg st="8" end="8"/>
+                                            </p:txEl>
+                                          </p:spTgt>
+                                        </p:tgtEl>
+                                        <p:attrNameLst>
+                                          <p:attrName>style.visibility</p:attrName>
+                                        </p:attrNameLst>
+                                      </p:cBhvr>
+                                      <p:to>
+                                        <p:strVal val="visible"/>
+                                      </p:to>
+                                    </p:set>
+                                  </p:childTnLst>
+                                </p:cTn>
+                              </p:par>
+                            </p:childTnLst>
+                          </p:cTn>
+                        </p:par>
+                      </p:childTnLst>
+                    </p:cTn>
+                  </p:par>
+                  <p:par>
+                    <p:cTn id="39" fill="hold">
+                      <p:stCondLst>
+                        <p:cond delay="indefinite"/>
+                      </p:stCondLst>
+                      <p:childTnLst>
+                        <p:par>
+                          <p:cTn id="40" fill="hold">
+                            <p:stCondLst>
+                              <p:cond delay="0"/>
+                            </p:stCondLst>
+                            <p:childTnLst>
+                              <p:par>
+                                <p:cTn id="41" presetID="1" presetClass="entr" presetSubtype="0" fill="hold" nodeType="clickEffect">
+                                  <p:stCondLst>
+                                    <p:cond delay="0"/>
+                                  </p:stCondLst>
+                                  <p:childTnLst>
+                                    <p:set>
+                                      <p:cBhvr>
+                                        <p:cTn id="42" dur="1" fill="hold">
+                                          <p:stCondLst>
+                                            <p:cond delay="0"/>
+                                          </p:stCondLst>
+                                        </p:cTn>
+                                        <p:tgtEl>
+                                          <p:spTgt spid="5">
+                                            <p:txEl>
+                                              <p:pRg st="9" end="9"/>
+                                            </p:txEl>
+                                          </p:spTgt>
+                                        </p:tgtEl>
+                                        <p:attrNameLst>
+                                          <p:attrName>style.visibility</p:attrName>
+                                        </p:attrNameLst>
+                                      </p:cBhvr>
+                                      <p:to>
+                                        <p:strVal val="visible"/>
+                                      </p:to>
+                                    </p:set>
+                                  </p:childTnLst>
+                                </p:cTn>
+                              </p:par>
+                            </p:childTnLst>
+                          </p:cTn>
+                        </p:par>
+                      </p:childTnLst>
+                    </p:cTn>
+                  </p:par>
+                  <p:par>
+                    <p:cTn id="43" fill="hold">
+                      <p:stCondLst>
+                        <p:cond delay="indefinite"/>
+                      </p:stCondLst>
+                      <p:childTnLst>
+                        <p:par>
+                          <p:cTn id="44" fill="hold">
+                            <p:stCondLst>
+                              <p:cond delay="0"/>
+                            </p:stCondLst>
+                            <p:childTnLst>
+                              <p:par>
+                                <p:cTn id="45" presetID="1" presetClass="entr" presetSubtype="0" fill="hold" nodeType="clickEffect">
+                                  <p:stCondLst>
+                                    <p:cond delay="0"/>
+                                  </p:stCondLst>
+                                  <p:childTnLst>
+                                    <p:set>
+                                      <p:cBhvr>
+                                        <p:cTn id="46" dur="1" fill="hold">
+                                          <p:stCondLst>
+                                            <p:cond delay="0"/>
+                                          </p:stCondLst>
+                                        </p:cTn>
+                                        <p:tgtEl>
+                                          <p:spTgt spid="5">
+                                            <p:txEl>
+                                              <p:pRg st="10" end="10"/>
+                                            </p:txEl>
+                                          </p:spTgt>
+                                        </p:tgtEl>
+                                        <p:attrNameLst>
+                                          <p:attrName>style.visibility</p:attrName>
+                                        </p:attrNameLst>
+                                      </p:cBhvr>
+                                      <p:to>
+                                        <p:strVal val="visible"/>
+                                      </p:to>
+                                    </p:set>
+                                  </p:childTnLst>
+                                </p:cTn>
+                              </p:par>
+                            </p:childTnLst>
+                          </p:cTn>
+                        </p:par>
+                      </p:childTnLst>
+                    </p:cTn>
+                  </p:par>
+                  <p:par>
+                    <p:cTn id="47" fill="hold">
+                      <p:stCondLst>
+                        <p:cond delay="indefinite"/>
+                      </p:stCondLst>
+                      <p:childTnLst>
+                        <p:par>
+                          <p:cTn id="48" fill="hold">
+                            <p:stCondLst>
+                              <p:cond delay="0"/>
+                            </p:stCondLst>
+                            <p:childTnLst>
+                              <p:par>
+                                <p:cTn id="49" presetID="1" presetClass="entr" presetSubtype="0" fill="hold" nodeType="clickEffect">
+                                  <p:stCondLst>
+                                    <p:cond delay="0"/>
+                                  </p:stCondLst>
+                                  <p:childTnLst>
+                                    <p:set>
+                                      <p:cBhvr>
+                                        <p:cTn id="50" dur="1" fill="hold">
+                                          <p:stCondLst>
+                                            <p:cond delay="0"/>
+                                          </p:stCondLst>
+                                        </p:cTn>
+                                        <p:tgtEl>
+                                          <p:spTgt spid="5">
+                                            <p:txEl>
+                                              <p:pRg st="11" end="11"/>
+                                            </p:txEl>
+                                          </p:spTgt>
+                                        </p:tgtEl>
+                                        <p:attrNameLst>
+                                          <p:attrName>style.visibility</p:attrName>
+                                        </p:attrNameLst>
+                                      </p:cBhvr>
+                                      <p:to>
+                                        <p:strVal val="visible"/>
+                                      </p:to>
+                                    </p:set>
+                                  </p:childTnLst>
+                                </p:cTn>
+                              </p:par>
+                            </p:childTnLst>
+                          </p:cTn>
+                        </p:par>
+                      </p:childTnLst>
+                    </p:cTn>
+                  </p:par>
+                  <p:par>
+                    <p:cTn id="51" fill="hold">
+                      <p:stCondLst>
+                        <p:cond delay="indefinite"/>
+                      </p:stCondLst>
+                      <p:childTnLst>
+                        <p:par>
+                          <p:cTn id="52" fill="hold">
+                            <p:stCondLst>
+                              <p:cond delay="0"/>
+                            </p:stCondLst>
+                            <p:childTnLst>
+                              <p:par>
+                                <p:cTn id="53" presetID="1" presetClass="entr" presetSubtype="0" fill="hold" nodeType="clickEffect">
+                                  <p:stCondLst>
+                                    <p:cond delay="0"/>
+                                  </p:stCondLst>
+                                  <p:childTnLst>
+                                    <p:set>
+                                      <p:cBhvr>
+                                        <p:cTn id="54" dur="1" fill="hold">
+                                          <p:stCondLst>
+                                            <p:cond delay="0"/>
+                                          </p:stCondLst>
+                                        </p:cTn>
+                                        <p:tgtEl>
+                                          <p:spTgt spid="5">
+                                            <p:txEl>
+                                              <p:pRg st="12" end="12"/>
+                                            </p:txEl>
+                                          </p:spTgt>
+                                        </p:tgtEl>
+                                        <p:attrNameLst>
+                                          <p:attrName>style.visibility</p:attrName>
+                                        </p:attrNameLst>
+                                      </p:cBhvr>
+                                      <p:to>
+                                        <p:strVal val="visible"/>
+                                      </p:to>
+                                    </p:set>
+                                  </p:childTnLst>
+                                </p:cTn>
+                              </p:par>
+                            </p:childTnLst>
+                          </p:cTn>
+                        </p:par>
+                      </p:childTnLst>
+                    </p:cTn>
+                  </p:par>
+                  <p:par>
+                    <p:cTn id="55" fill="hold">
+                      <p:stCondLst>
+                        <p:cond delay="indefinite"/>
+                      </p:stCondLst>
+                      <p:childTnLst>
+                        <p:par>
+                          <p:cTn id="56" fill="hold">
+                            <p:stCondLst>
+                              <p:cond delay="0"/>
+                            </p:stCondLst>
+                            <p:childTnLst>
+                              <p:par>
+                                <p:cTn id="57" presetID="1" presetClass="entr" presetSubtype="0" fill="hold" nodeType="clickEffect">
+                                  <p:stCondLst>
+                                    <p:cond delay="0"/>
+                                  </p:stCondLst>
+                                  <p:childTnLst>
+                                    <p:set>
+                                      <p:cBhvr>
+                                        <p:cTn id="58" dur="1" fill="hold">
+                                          <p:stCondLst>
+                                            <p:cond delay="0"/>
+                                          </p:stCondLst>
+                                        </p:cTn>
+                                        <p:tgtEl>
+                                          <p:spTgt spid="5">
+                                            <p:txEl>
+                                              <p:pRg st="13" end="13"/>
+                                            </p:txEl>
+                                          </p:spTgt>
+                                        </p:tgtEl>
+                                        <p:attrNameLst>
+                                          <p:attrName>style.visibility</p:attrName>
+                                        </p:attrNameLst>
+                                      </p:cBhvr>
+                                      <p:to>
+                                        <p:strVal val="visible"/>
+                                      </p:to>
+                                    </p:set>
+                                  </p:childTnLst>
+                                </p:cTn>
+                              </p:par>
+                            </p:childTnLst>
+                          </p:cTn>
+                        </p:par>
+                      </p:childTnLst>
+                    </p:cTn>
+                  </p:par>
+                  <p:par>
+                    <p:cTn id="59" fill="hold">
+                      <p:stCondLst>
+                        <p:cond delay="indefinite"/>
+                      </p:stCondLst>
+                      <p:childTnLst>
+                        <p:par>
+                          <p:cTn id="60" fill="hold">
+                            <p:stCondLst>
+                              <p:cond delay="0"/>
+                            </p:stCondLst>
+                            <p:childTnLst>
+                              <p:par>
+                                <p:cTn id="61" presetID="1" presetClass="entr" presetSubtype="0" fill="hold" nodeType="clickEffect">
+                                  <p:stCondLst>
+                                    <p:cond delay="0"/>
+                                  </p:stCondLst>
+                                  <p:childTnLst>
+                                    <p:set>
+                                      <p:cBhvr>
+                                        <p:cTn id="62" dur="1" fill="hold">
+                                          <p:stCondLst>
+                                            <p:cond delay="0"/>
+                                          </p:stCondLst>
+                                        </p:cTn>
+                                        <p:tgtEl>
+                                          <p:spTgt spid="5">
+                                            <p:txEl>
+                                              <p:pRg st="14" end="14"/>
+                                            </p:txEl>
+                                          </p:spTgt>
+                                        </p:tgtEl>
+                                        <p:attrNameLst>
+                                          <p:attrName>style.visibility</p:attrName>
+                                        </p:attrNameLst>
+                                      </p:cBhvr>
+                                      <p:to>
+                                        <p:strVal val="visible"/>
+                                      </p:to>
+                                    </p:set>
+                                  </p:childTnLst>
+                                </p:cTn>
+                              </p:par>
+                            </p:childTnLst>
+                          </p:cTn>
+                        </p:par>
+                      </p:childTnLst>
+                    </p:cTn>
+                  </p:par>
+                  <p:par>
+                    <p:cTn id="63" fill="hold">
+                      <p:stCondLst>
+                        <p:cond delay="indefinite"/>
+                      </p:stCondLst>
+                      <p:childTnLst>
+                        <p:par>
+                          <p:cTn id="64" fill="hold">
+                            <p:stCondLst>
+                              <p:cond delay="0"/>
+                            </p:stCondLst>
+                            <p:childTnLst>
+                              <p:par>
+                                <p:cTn id="65" presetID="1" presetClass="entr" presetSubtype="0" fill="hold" nodeType="clickEffect">
+                                  <p:stCondLst>
+                                    <p:cond delay="0"/>
+                                  </p:stCondLst>
+                                  <p:childTnLst>
+                                    <p:set>
+                                      <p:cBhvr>
+                                        <p:cTn id="66" dur="1" fill="hold">
+                                          <p:stCondLst>
+                                            <p:cond delay="0"/>
+                                          </p:stCondLst>
+                                        </p:cTn>
+                                        <p:tgtEl>
+                                          <p:spTgt spid="5">
+                                            <p:txEl>
+                                              <p:pRg st="15" end="15"/>
+                                            </p:txEl>
+                                          </p:spTgt>
+                                        </p:tgtEl>
+                                        <p:attrNameLst>
+                                          <p:attrName>style.visibility</p:attrName>
+                                        </p:attrNameLst>
+                                      </p:cBhvr>
+                                      <p:to>
+                                        <p:strVal val="visible"/>
+                                      </p:to>
+                                    </p:set>
+                                  </p:childTnLst>
+                                </p:cTn>
+                              </p:par>
+                            </p:childTnLst>
+                          </p:cTn>
+                        </p:par>
+                      </p:childTnLst>
+                    </p:cTn>
+                  </p:par>
+                </p:childTnLst>
+              </p:cTn>
+              <p:prevCondLst>
+                <p:cond evt="onPrev" delay="0">
+                  <p:tgtEl>
+                    <p:sldTgt/>
+                  </p:tgtEl>
+                </p:cond>
+              </p:prevCondLst>
+              <p:nextCondLst>
+                <p:cond evt="onNext" delay="0">
+                  <p:tgtEl>
+                    <p:sldTgt/>
+                  </p:tgtEl>
+                </p:cond>
+              </p:nextCondLst>
+            </p:seq>
+          </p:childTnLst>
+        </p:cTn>
+      </p:par>
+    </p:tnLst>
+  </p:timing>
 </p:sld>
 </file>
 
@@ -4638,7 +6016,41 @@
       </p:grpSpPr>
       <p:sp>
         <p:nvSpPr>
-          <p:cNvPr id="3" name="Content Placeholder 2"/>
+          <p:cNvPr id="2" name="Title 1">
+            <a:extLst>
+              <a:ext uri="{FF2B5EF4-FFF2-40B4-BE49-F238E27FC236}">
+                <a16:creationId xmlns:a16="http://schemas.microsoft.com/office/drawing/2014/main" id="{5D28F791-D8B9-5945-B212-6B5529EA4C4E}"/>
+              </a:ext>
+            </a:extLst>
+          </p:cNvPr>
+          <p:cNvSpPr>
+            <a:spLocks noGrp="1"/>
+          </p:cNvSpPr>
+          <p:nvPr>
+            <p:ph type="title"/>
+          </p:nvPr>
+        </p:nvSpPr>
+        <p:spPr/>
+        <p:txBody>
+          <a:bodyPr/>
+          <a:lstStyle/>
+          <a:p>
+            <a:r>
+              <a:rPr lang="en-US" dirty="0"/>
+              <a:t>Results section</a:t>
+            </a:r>
+          </a:p>
+        </p:txBody>
+      </p:sp>
+      <p:sp>
+        <p:nvSpPr>
+          <p:cNvPr id="3" name="Content Placeholder 2">
+            <a:extLst>
+              <a:ext uri="{FF2B5EF4-FFF2-40B4-BE49-F238E27FC236}">
+                <a16:creationId xmlns:a16="http://schemas.microsoft.com/office/drawing/2014/main" id="{B88C478B-3FC4-D84E-88FE-B841E43AE2C9}"/>
+              </a:ext>
+            </a:extLst>
+          </p:cNvPr>
           <p:cNvSpPr>
             <a:spLocks noGrp="1"/>
           </p:cNvSpPr>
@@ -4648,85 +6060,88 @@
         </p:nvSpPr>
         <p:spPr>
           <a:xfrm>
-            <a:off x="457200" y="1295400"/>
-            <a:ext cx="8229600" cy="5287963"/>
+            <a:off x="457200" y="1600200"/>
+            <a:ext cx="8229600" cy="4983162"/>
           </a:xfrm>
         </p:spPr>
         <p:txBody>
           <a:bodyPr>
-            <a:normAutofit/>
+            <a:normAutofit fontScale="92500" lnSpcReduction="20000"/>
           </a:bodyPr>
           <a:lstStyle/>
           <a:p>
             <a:r>
               <a:rPr lang="en-US" dirty="0"/>
-              <a:t>Mention how you got to final model.</a:t>
-            </a:r>
-          </a:p>
-          <a:p>
-            <a:pPr lvl="1"/>
-            <a:r>
-              <a:rPr lang="en-US" dirty="0"/>
-              <a:t>E.g. ‘using model selection, we …’</a:t>
-            </a:r>
-          </a:p>
-          <a:p>
-            <a:r>
-              <a:rPr lang="en-US" dirty="0"/>
-              <a:t>Report assessment of model adequacy (e.g. R</a:t>
-            </a:r>
-            <a:r>
-              <a:rPr lang="en-US" baseline="30000" dirty="0"/>
-              <a:t>2</a:t>
-            </a:r>
-            <a:r>
-              <a:rPr lang="en-US" dirty="0"/>
-              <a:t> from predicted/observed; proportion of deviance explained)</a:t>
-            </a:r>
-          </a:p>
-          <a:p>
-            <a:pPr lvl="1"/>
+              <a:t>Choose only the necessary graphs, tables, and data for telling your story. </a:t>
+            </a:r>
+          </a:p>
+          <a:p>
+            <a:r>
+              <a:rPr lang="en-US" dirty="0"/>
+              <a:t>Craft a descriptive sentence or set of sentences that explain what you found, biologically. Keep the statistics to parentheses or tables. </a:t>
+            </a:r>
+          </a:p>
+          <a:p>
+            <a:pPr marL="0" indent="0">
+              <a:buNone/>
+            </a:pPr>
+            <a:r>
+              <a:rPr lang="en-US" sz="2400" dirty="0"/>
+              <a:t>	“By day 8, cowbirds reared with host young were, on average, 	14% heavier than cowbirds reared alone (unpaired t</a:t>
+            </a:r>
+            <a:r>
+              <a:rPr lang="en-US" sz="2400" baseline="-25000" dirty="0"/>
+              <a:t>16</a:t>
+            </a:r>
+            <a:r>
+              <a:rPr lang="en-US" sz="2400" dirty="0"/>
+              <a:t> = −2.23, 	P = 0.041, Fig. 2A).”(</a:t>
+            </a:r>
+            <a:r>
+              <a:rPr lang="en-US" sz="2400" dirty="0" err="1"/>
+              <a:t>Kilner</a:t>
+            </a:r>
+            <a:r>
+              <a:rPr lang="en-US" sz="2400" dirty="0"/>
+              <a:t> et al. </a:t>
+            </a:r>
+            <a:r>
+              <a:rPr lang="en-US" sz="2400" dirty="0">
+                <a:hlinkClick r:id="rId2"/>
+              </a:rPr>
+              <a:t>2004</a:t>
+            </a:r>
+            <a:r>
+              <a:rPr lang="en-US" sz="2400" dirty="0"/>
+              <a:t>)</a:t>
+            </a:r>
+          </a:p>
+          <a:p>
+            <a:pPr marL="0" indent="0">
+              <a:buNone/>
+            </a:pPr>
             <a:endParaRPr lang="en-US" dirty="0"/>
           </a:p>
           <a:p>
-            <a:pPr lvl="1"/>
-            <a:endParaRPr lang="en-US" dirty="0"/>
-          </a:p>
-          <a:p>
-            <a:endParaRPr lang="en-US" dirty="0"/>
-          </a:p>
-        </p:txBody>
-      </p:sp>
-      <p:sp>
-        <p:nvSpPr>
-          <p:cNvPr id="4" name="Title 3"/>
-          <p:cNvSpPr>
-            <a:spLocks noGrp="1"/>
-          </p:cNvSpPr>
-          <p:nvPr>
-            <p:ph type="title"/>
-          </p:nvPr>
-        </p:nvSpPr>
-        <p:spPr>
-          <a:xfrm>
-            <a:off x="457200" y="0"/>
-            <a:ext cx="8229600" cy="1143000"/>
-          </a:xfrm>
-        </p:spPr>
-        <p:txBody>
-          <a:bodyPr>
-            <a:normAutofit/>
-          </a:bodyPr>
-          <a:lstStyle/>
-          <a:p>
-            <a:r>
-              <a:rPr lang="en-US" dirty="0"/>
-              <a:t>Results- in text</a:t>
+            <a:r>
+              <a:rPr lang="en-US" dirty="0"/>
+              <a:t>Use subsections if there are multiple parts</a:t>
+            </a:r>
+          </a:p>
+          <a:p>
+            <a:r>
+              <a:rPr lang="en-US" dirty="0"/>
+              <a:t>If you want to discuss data in the discussion, you must present it in the results. </a:t>
             </a:r>
           </a:p>
         </p:txBody>
       </p:sp>
     </p:spTree>
+    <p:extLst>
+      <p:ext uri="{BB962C8B-B14F-4D97-AF65-F5344CB8AC3E}">
+        <p14:creationId xmlns:p14="http://schemas.microsoft.com/office/powerpoint/2010/main" val="1640210840"/>
+      </p:ext>
+    </p:extLst>
   </p:cSld>
   <p:clrMapOvr>
     <a:masterClrMapping/>
@@ -4761,7 +6176,12 @@
             <p:ph idx="1"/>
           </p:nvPr>
         </p:nvSpPr>
-        <p:spPr/>
+        <p:spPr>
+          <a:xfrm>
+            <a:off x="457200" y="1295400"/>
+            <a:ext cx="8229600" cy="5287963"/>
+          </a:xfrm>
+        </p:spPr>
         <p:txBody>
           <a:bodyPr>
             <a:normAutofit/>
@@ -4770,72 +6190,67 @@
           <a:p>
             <a:r>
               <a:rPr lang="en-US" dirty="0"/>
-              <a:t>Describe relationships between variables in best fitting model (e.g. x was negatively related to y);  Should only do this with significant variables. </a:t>
-            </a:r>
-          </a:p>
-          <a:p>
-            <a:r>
-              <a:rPr lang="en-US" dirty="0"/>
-              <a:t>Present estimated mean (coefficient from model) and standard error from optimal model</a:t>
-            </a:r>
+              <a:t>Mention how you got to final model.</a:t>
+            </a:r>
+          </a:p>
+          <a:p>
+            <a:pPr lvl="1"/>
+            <a:r>
+              <a:rPr lang="en-US" dirty="0"/>
+              <a:t>E.g. ‘using model selection, we …’</a:t>
+            </a:r>
+          </a:p>
+          <a:p>
+            <a:r>
+              <a:rPr lang="en-US" dirty="0"/>
+              <a:t>Report assessment of model adequacy (e.g. R</a:t>
+            </a:r>
+            <a:r>
+              <a:rPr lang="en-US" baseline="30000" dirty="0"/>
+              <a:t>2</a:t>
+            </a:r>
+            <a:r>
+              <a:rPr lang="en-US" dirty="0"/>
+              <a:t> from predicted/observed; proportion of deviance explained)</a:t>
+            </a:r>
+          </a:p>
+          <a:p>
+            <a:pPr lvl="1"/>
+            <a:endParaRPr lang="en-US" dirty="0"/>
+          </a:p>
+          <a:p>
+            <a:pPr lvl="1"/>
+            <a:endParaRPr lang="en-US" dirty="0"/>
+          </a:p>
+          <a:p>
+            <a:endParaRPr lang="en-US" dirty="0"/>
           </a:p>
         </p:txBody>
       </p:sp>
       <p:sp>
         <p:nvSpPr>
           <p:cNvPr id="4" name="Title 3"/>
-          <p:cNvSpPr txBox="1">
-            <a:spLocks/>
-          </p:cNvSpPr>
-          <p:nvPr/>
+          <p:cNvSpPr>
+            <a:spLocks noGrp="1"/>
+          </p:cNvSpPr>
+          <p:nvPr>
+            <p:ph type="title"/>
+          </p:nvPr>
         </p:nvSpPr>
         <p:spPr>
           <a:xfrm>
-            <a:off x="457200" y="304800"/>
+            <a:off x="457200" y="0"/>
             <a:ext cx="8229600" cy="1143000"/>
           </a:xfrm>
-          <a:prstGeom prst="rect">
-            <a:avLst/>
-          </a:prstGeom>
         </p:spPr>
         <p:txBody>
-          <a:bodyPr vert="horz" lIns="91440" tIns="45720" rIns="91440" bIns="45720" rtlCol="0" anchor="ctr">
+          <a:bodyPr>
             <a:normAutofit/>
           </a:bodyPr>
           <a:lstStyle/>
           <a:p>
-            <a:pPr marL="0" marR="0" lvl="0" indent="0" algn="ctr" defTabSz="914400" rtl="0" eaLnBrk="1" fontAlgn="auto" latinLnBrk="0" hangingPunct="1">
-              <a:lnSpc>
-                <a:spcPct val="100000"/>
-              </a:lnSpc>
-              <a:spcBef>
-                <a:spcPct val="0"/>
-              </a:spcBef>
-              <a:spcAft>
-                <a:spcPts val="0"/>
-              </a:spcAft>
-              <a:buClrTx/>
-              <a:buSzTx/>
-              <a:buFontTx/>
-              <a:buNone/>
-              <a:tabLst/>
-              <a:defRPr/>
-            </a:pPr>
-            <a:r>
-              <a:rPr kumimoji="0" lang="en-US" sz="4400" b="0" i="0" u="none" strike="noStrike" kern="1200" cap="none" spc="0" normalizeH="0" baseline="0" noProof="0" dirty="0">
-                <a:ln>
-                  <a:noFill/>
-                </a:ln>
-                <a:solidFill>
-                  <a:schemeClr val="tx1"/>
-                </a:solidFill>
-                <a:effectLst/>
-                <a:uLnTx/>
-                <a:uFillTx/>
-                <a:latin typeface="+mj-lt"/>
-                <a:ea typeface="+mj-ea"/>
-                <a:cs typeface="+mj-cs"/>
-              </a:rPr>
+            <a:r>
+              <a:rPr lang="en-US" dirty="0"/>
               <a:t>Results- in text</a:t>
             </a:r>
           </a:p>
@@ -4868,28 +6283,6 @@
       </p:grpSpPr>
       <p:sp>
         <p:nvSpPr>
-          <p:cNvPr id="2" name="Title 1"/>
-          <p:cNvSpPr>
-            <a:spLocks noGrp="1"/>
-          </p:cNvSpPr>
-          <p:nvPr>
-            <p:ph type="title"/>
-          </p:nvPr>
-        </p:nvSpPr>
-        <p:spPr/>
-        <p:txBody>
-          <a:bodyPr/>
-          <a:lstStyle/>
-          <a:p>
-            <a:r>
-              <a:rPr lang="en-US" dirty="0"/>
-              <a:t>Results – in text</a:t>
-            </a:r>
-          </a:p>
-        </p:txBody>
-      </p:sp>
-      <p:sp>
-        <p:nvSpPr>
           <p:cNvPr id="3" name="Content Placeholder 2"/>
           <p:cNvSpPr>
             <a:spLocks noGrp="1"/>
@@ -4907,46 +6300,73 @@
           <a:p>
             <a:r>
               <a:rPr lang="en-US" dirty="0"/>
-              <a:t>For LM report </a:t>
-            </a:r>
-            <a:r>
-              <a:rPr lang="en-US" b="1" dirty="0"/>
-              <a:t>all</a:t>
-            </a:r>
-            <a:r>
-              <a:rPr lang="en-US" dirty="0"/>
-              <a:t> F and p values if even non-significant.</a:t>
-            </a:r>
-          </a:p>
-          <a:p>
-            <a:pPr lvl="1"/>
-            <a:r>
-              <a:rPr lang="en-US" b="1" dirty="0"/>
-              <a:t>Text: </a:t>
-            </a:r>
-            <a:r>
-              <a:rPr lang="en-US" dirty="0"/>
-              <a:t>(Test Name, F = all values , p = all values)</a:t>
-            </a:r>
-          </a:p>
-          <a:p>
-            <a:r>
-              <a:rPr lang="en-US" dirty="0"/>
-              <a:t>If use Likelihood Ratio Test to test whether something is significant, report p-value (chi symbol with </a:t>
-            </a:r>
-            <a:r>
-              <a:rPr lang="en-US" dirty="0" err="1"/>
-              <a:t>df</a:t>
-            </a:r>
-            <a:r>
-              <a:rPr lang="en-US" dirty="0"/>
-              <a:t>, LRT, and p-value)</a:t>
-            </a:r>
-          </a:p>
-          <a:p>
-            <a:r>
-              <a:rPr lang="en-US" dirty="0"/>
-              <a:t>P values are more informative than symbols such as * and **</a:t>
+              <a:t>Describe relationships between variables in best fitting model (e.g. as x increased, y decreased);  Should only do this with significant variables. </a:t>
+            </a:r>
+          </a:p>
+          <a:p>
+            <a:r>
+              <a:rPr lang="en-US" dirty="0"/>
+              <a:t>Present estimated mean (coefficient from model) and standard error from optimal model</a:t>
+            </a:r>
+          </a:p>
+        </p:txBody>
+      </p:sp>
+      <p:sp>
+        <p:nvSpPr>
+          <p:cNvPr id="4" name="Title 3"/>
+          <p:cNvSpPr txBox="1">
+            <a:spLocks/>
+          </p:cNvSpPr>
+          <p:nvPr/>
+        </p:nvSpPr>
+        <p:spPr>
+          <a:xfrm>
+            <a:off x="457200" y="304800"/>
+            <a:ext cx="8229600" cy="1143000"/>
+          </a:xfrm>
+          <a:prstGeom prst="rect">
+            <a:avLst/>
+          </a:prstGeom>
+        </p:spPr>
+        <p:txBody>
+          <a:bodyPr vert="horz" lIns="91440" tIns="45720" rIns="91440" bIns="45720" rtlCol="0" anchor="ctr">
+            <a:normAutofit/>
+          </a:bodyPr>
+          <a:lstStyle/>
+          <a:p>
+            <a:pPr marL="0" marR="0" lvl="0" indent="0" algn="ctr" defTabSz="914400" rtl="0" eaLnBrk="1" fontAlgn="auto" latinLnBrk="0" hangingPunct="1">
+              <a:lnSpc>
+                <a:spcPct val="100000"/>
+              </a:lnSpc>
+              <a:spcBef>
+                <a:spcPct val="0"/>
+              </a:spcBef>
+              <a:spcAft>
+                <a:spcPts val="0"/>
+              </a:spcAft>
+              <a:buClrTx/>
+              <a:buSzTx/>
+              <a:buFontTx/>
+              <a:buNone/>
+              <a:tabLst/>
+              <a:defRPr/>
+            </a:pPr>
+            <a:r>
+              <a:rPr kumimoji="0" lang="en-US" sz="4400" b="0" i="0" u="none" strike="noStrike" kern="1200" cap="none" spc="0" normalizeH="0" baseline="0" noProof="0" dirty="0">
+                <a:ln>
+                  <a:noFill/>
+                </a:ln>
+                <a:solidFill>
+                  <a:schemeClr val="tx1"/>
+                </a:solidFill>
+                <a:effectLst/>
+                <a:uLnTx/>
+                <a:uFillTx/>
+                <a:latin typeface="+mj-lt"/>
+                <a:ea typeface="+mj-ea"/>
+                <a:cs typeface="+mj-cs"/>
+              </a:rPr>
+              <a:t>Results- in text</a:t>
             </a:r>
           </a:p>
         </p:txBody>

</xml_diff>